<commit_message>
updates for day 1 and day 2
</commit_message>
<xml_diff>
--- a/administrative/documents/day1_agenda.pptx
+++ b/administrative/documents/day1_agenda.pptx
@@ -9882,6 +9882,30 @@
           </a:bodyPr>
           <a:lstStyle/>
           <a:p>
+            <a:pPr marL="444500">
+              <a:lnSpc>
+                <a:spcPct val="95000"/>
+              </a:lnSpc>
+              <a:buSzPts val="2000"/>
+            </a:pPr>
+            <a:r>
+              <a:rPr lang="en-US" sz="2000" dirty="0"/>
+              <a:t>Sublime Text:</a:t>
+            </a:r>
+          </a:p>
+          <a:p>
+            <a:pPr marL="444500">
+              <a:lnSpc>
+                <a:spcPct val="95000"/>
+              </a:lnSpc>
+              <a:buSzPts val="2000"/>
+            </a:pPr>
+            <a:r>
+              <a:rPr lang="en-US" sz="2000" dirty="0"/>
+              <a:t>One Markdown: </a:t>
+            </a:r>
+          </a:p>
+          <a:p>
             <a:pPr marL="444500" lvl="0" indent="-342900" algn="l" rtl="0">
               <a:lnSpc>
                 <a:spcPct val="95000"/>
@@ -9896,10 +9920,10 @@
               <a:buChar char="●"/>
             </a:pPr>
             <a:r>
-              <a:rPr lang="en" sz="2000"/>
+              <a:rPr lang="en" sz="2000" dirty="0"/>
               <a:t>GitHub Documents:</a:t>
             </a:r>
-            <a:endParaRPr/>
+            <a:endParaRPr dirty="0"/>
           </a:p>
           <a:p>
             <a:pPr marL="901700" lvl="1" indent="-317500" algn="l" rtl="0">
@@ -9916,7 +9940,7 @@
               <a:buChar char="○"/>
             </a:pPr>
             <a:r>
-              <a:rPr lang="en" sz="1600" u="sng">
+              <a:rPr lang="en" sz="1600" u="sng" dirty="0">
                 <a:solidFill>
                   <a:schemeClr val="hlink"/>
                 </a:solidFill>
@@ -9924,7 +9948,7 @@
               </a:rPr>
               <a:t>https://github.com/COMP122</a:t>
             </a:r>
-            <a:endParaRPr sz="1600"/>
+            <a:endParaRPr sz="1600" dirty="0"/>
           </a:p>
           <a:p>
             <a:pPr marL="901700" lvl="1" indent="-317500" algn="l" rtl="0">
@@ -9941,11 +9965,11 @@
               <a:buChar char="○"/>
             </a:pPr>
             <a:r>
-              <a:rPr lang="en" sz="1600"/>
+              <a:rPr lang="en" sz="1600" dirty="0"/>
               <a:t>Invitations URLs:  for example: </a:t>
             </a:r>
             <a:r>
-              <a:rPr lang="en" sz="1600" u="sng">
+              <a:rPr lang="en" sz="1600" u="sng" dirty="0">
                 <a:solidFill>
                   <a:schemeClr val="hlink"/>
                 </a:solidFill>
@@ -9953,7 +9977,7 @@
               </a:rPr>
               <a:t>https://classroom.github.com/a/c1oXvbim</a:t>
             </a:r>
-            <a:endParaRPr sz="1600"/>
+            <a:endParaRPr sz="1600" dirty="0"/>
           </a:p>
           <a:p>
             <a:pPr marL="444500" lvl="0" indent="-342900" algn="l" rtl="0">
@@ -9970,10 +9994,18 @@
               <a:buChar char="●"/>
             </a:pPr>
             <a:r>
-              <a:rPr lang="en" sz="2000"/>
-              <a:t>Living Documents (on my.csun.edu – drive) </a:t>
+              <a:rPr lang="en" sz="2000" dirty="0"/>
+              <a:t>Living Documents (on </a:t>
             </a:r>
-            <a:endParaRPr/>
+            <a:r>
+              <a:rPr lang="en" sz="2000" dirty="0" err="1"/>
+              <a:t>my.csun.edu</a:t>
+            </a:r>
+            <a:r>
+              <a:rPr lang="en" sz="2000" dirty="0"/>
+              <a:t> – drive) </a:t>
+            </a:r>
+            <a:endParaRPr dirty="0"/>
           </a:p>
           <a:p>
             <a:pPr marL="844550" lvl="1" indent="-285750" algn="l" rtl="0">
@@ -9990,7 +10022,7 @@
               <a:buChar char="○"/>
             </a:pPr>
             <a:r>
-              <a:rPr lang="en" sz="1600" u="sng">
+              <a:rPr lang="en" sz="1600" u="sng" dirty="0">
                 <a:solidFill>
                   <a:schemeClr val="hlink"/>
                 </a:solidFill>
@@ -9998,7 +10030,7 @@
               </a:rPr>
               <a:t>https://drive.google.com/drive/u/0/folders/1WpDQTpX-rFnPNkcynDI2-7faFX0qOzjH</a:t>
             </a:r>
-            <a:endParaRPr sz="1600"/>
+            <a:endParaRPr sz="1600" dirty="0"/>
           </a:p>
           <a:p>
             <a:pPr marL="844550" lvl="1" indent="-285750" algn="l" rtl="0">
@@ -10015,10 +10047,10 @@
               <a:buChar char="○"/>
             </a:pPr>
             <a:r>
-              <a:rPr lang="en" sz="1600"/>
+              <a:rPr lang="en" sz="1600" dirty="0"/>
               <a:t>Copies are in: */documents/*</a:t>
             </a:r>
-            <a:endParaRPr/>
+            <a:endParaRPr dirty="0"/>
           </a:p>
           <a:p>
             <a:pPr marL="444500" lvl="0" indent="-342900" algn="l" rtl="0">
@@ -10035,15 +10067,15 @@
               <a:buChar char="●"/>
             </a:pPr>
             <a:r>
-              <a:rPr lang="en" sz="2000"/>
+              <a:rPr lang="en" sz="2000" dirty="0"/>
               <a:t>Class Discussions: </a:t>
             </a:r>
             <a:r>
-              <a:rPr lang="en" sz="1600"/>
+              <a:rPr lang="en" sz="1600" dirty="0"/>
               <a:t>Slack: </a:t>
             </a:r>
             <a:r>
-              <a:rPr lang="en" sz="1600" u="sng">
+              <a:rPr lang="en" sz="1600" u="sng" dirty="0">
                 <a:solidFill>
                   <a:schemeClr val="accent5"/>
                 </a:solidFill>
@@ -10057,7 +10089,7 @@
               </a:rPr>
               <a:t>comp122-csun.slack.com</a:t>
             </a:r>
-            <a:endParaRPr sz="1600" u="sng">
+            <a:endParaRPr sz="1600" u="sng" dirty="0">
               <a:solidFill>
                 <a:schemeClr val="accent5"/>
               </a:solidFill>
@@ -10078,7 +10110,7 @@
               <a:buChar char="○"/>
             </a:pPr>
             <a:r>
-              <a:rPr lang="en" sz="1600">
+              <a:rPr lang="en" sz="1600" dirty="0">
                 <a:solidFill>
                   <a:schemeClr val="dk1"/>
                 </a:solidFill>
@@ -10086,54 +10118,14 @@
               <a:t>channel: </a:t>
             </a:r>
             <a:r>
-              <a:rPr lang="en" sz="1600" u="sng">
+              <a:rPr lang="en" sz="1600" u="sng" dirty="0">
                 <a:solidFill>
                   <a:schemeClr val="accent5"/>
                 </a:solidFill>
               </a:rPr>
               <a:t>#fitzgerald-s23</a:t>
             </a:r>
-            <a:endParaRPr sz="1600"/>
-          </a:p>
-          <a:p>
-            <a:pPr marL="444500" lvl="0" indent="-342900" algn="l" rtl="0">
-              <a:lnSpc>
-                <a:spcPct val="95000"/>
-              </a:lnSpc>
-              <a:spcBef>
-                <a:spcPts val="0"/>
-              </a:spcBef>
-              <a:spcAft>
-                <a:spcPts val="0"/>
-              </a:spcAft>
-              <a:buSzPts val="2000"/>
-              <a:buChar char="●"/>
-            </a:pPr>
-            <a:r>
-              <a:rPr lang="en" sz="2000"/>
-              <a:t>One Markdown: </a:t>
-            </a:r>
-            <a:endParaRPr/>
-          </a:p>
-          <a:p>
-            <a:pPr marL="444500" lvl="0" indent="-342900" algn="l" rtl="0">
-              <a:lnSpc>
-                <a:spcPct val="95000"/>
-              </a:lnSpc>
-              <a:spcBef>
-                <a:spcPts val="0"/>
-              </a:spcBef>
-              <a:spcAft>
-                <a:spcPts val="0"/>
-              </a:spcAft>
-              <a:buSzPts val="2000"/>
-              <a:buChar char="●"/>
-            </a:pPr>
-            <a:r>
-              <a:rPr lang="en" sz="2000"/>
-              <a:t>Sublime Text:</a:t>
-            </a:r>
-            <a:endParaRPr/>
+            <a:endParaRPr sz="1600" dirty="0"/>
           </a:p>
           <a:p>
             <a:pPr marL="457200" lvl="0" indent="-342900" algn="l" rtl="0">
@@ -10150,10 +10142,18 @@
               <a:buChar char="●"/>
             </a:pPr>
             <a:r>
-              <a:rPr lang="en" sz="2000"/>
-              <a:t>Class material:  bin/, reference/, and mips/</a:t>
+              <a:rPr lang="en" sz="2000" dirty="0"/>
+              <a:t>Class material:  bin/, reference/, and </a:t>
             </a:r>
-            <a:endParaRPr sz="2000">
+            <a:r>
+              <a:rPr lang="en" sz="2000" dirty="0" err="1"/>
+              <a:t>mips</a:t>
+            </a:r>
+            <a:r>
+              <a:rPr lang="en" sz="2000" dirty="0"/>
+              <a:t>/</a:t>
+            </a:r>
+            <a:endParaRPr sz="2000" dirty="0">
               <a:solidFill>
                 <a:schemeClr val="dk1"/>
               </a:solidFill>

</xml_diff>